<commit_message>
Remove W at the compressor in the DHP.png; the sensor is not there.
</commit_message>
<xml_diff>
--- a/docs/DHP.pptx
+++ b/docs/DHP.pptx
@@ -288,7 +288,7 @@
           <a:p>
             <a:fld id="{BFEB8134-79A7-470D-984F-A9AEAC224976}" type="datetimeFigureOut">
               <a:rPr lang="en-US" smtClean="0"/>
-              <a:t>11/21/2013</a:t>
+              <a:t>12/5/2013</a:t>
             </a:fld>
             <a:endParaRPr lang="en-US"/>
           </a:p>
@@ -458,7 +458,7 @@
           <a:p>
             <a:fld id="{BFEB8134-79A7-470D-984F-A9AEAC224976}" type="datetimeFigureOut">
               <a:rPr lang="en-US" smtClean="0"/>
-              <a:t>11/21/2013</a:t>
+              <a:t>12/5/2013</a:t>
             </a:fld>
             <a:endParaRPr lang="en-US"/>
           </a:p>
@@ -638,7 +638,7 @@
           <a:p>
             <a:fld id="{BFEB8134-79A7-470D-984F-A9AEAC224976}" type="datetimeFigureOut">
               <a:rPr lang="en-US" smtClean="0"/>
-              <a:t>11/21/2013</a:t>
+              <a:t>12/5/2013</a:t>
             </a:fld>
             <a:endParaRPr lang="en-US"/>
           </a:p>
@@ -808,7 +808,7 @@
           <a:p>
             <a:fld id="{BFEB8134-79A7-470D-984F-A9AEAC224976}" type="datetimeFigureOut">
               <a:rPr lang="en-US" smtClean="0"/>
-              <a:t>11/21/2013</a:t>
+              <a:t>12/5/2013</a:t>
             </a:fld>
             <a:endParaRPr lang="en-US"/>
           </a:p>
@@ -1054,7 +1054,7 @@
           <a:p>
             <a:fld id="{BFEB8134-79A7-470D-984F-A9AEAC224976}" type="datetimeFigureOut">
               <a:rPr lang="en-US" smtClean="0"/>
-              <a:t>11/21/2013</a:t>
+              <a:t>12/5/2013</a:t>
             </a:fld>
             <a:endParaRPr lang="en-US"/>
           </a:p>
@@ -1342,7 +1342,7 @@
           <a:p>
             <a:fld id="{BFEB8134-79A7-470D-984F-A9AEAC224976}" type="datetimeFigureOut">
               <a:rPr lang="en-US" smtClean="0"/>
-              <a:t>11/21/2013</a:t>
+              <a:t>12/5/2013</a:t>
             </a:fld>
             <a:endParaRPr lang="en-US"/>
           </a:p>
@@ -1764,7 +1764,7 @@
           <a:p>
             <a:fld id="{BFEB8134-79A7-470D-984F-A9AEAC224976}" type="datetimeFigureOut">
               <a:rPr lang="en-US" smtClean="0"/>
-              <a:t>11/21/2013</a:t>
+              <a:t>12/5/2013</a:t>
             </a:fld>
             <a:endParaRPr lang="en-US"/>
           </a:p>
@@ -1882,7 +1882,7 @@
           <a:p>
             <a:fld id="{BFEB8134-79A7-470D-984F-A9AEAC224976}" type="datetimeFigureOut">
               <a:rPr lang="en-US" smtClean="0"/>
-              <a:t>11/21/2013</a:t>
+              <a:t>12/5/2013</a:t>
             </a:fld>
             <a:endParaRPr lang="en-US"/>
           </a:p>
@@ -1977,7 +1977,7 @@
           <a:p>
             <a:fld id="{BFEB8134-79A7-470D-984F-A9AEAC224976}" type="datetimeFigureOut">
               <a:rPr lang="en-US" smtClean="0"/>
-              <a:t>11/21/2013</a:t>
+              <a:t>12/5/2013</a:t>
             </a:fld>
             <a:endParaRPr lang="en-US"/>
           </a:p>
@@ -2254,7 +2254,7 @@
           <a:p>
             <a:fld id="{BFEB8134-79A7-470D-984F-A9AEAC224976}" type="datetimeFigureOut">
               <a:rPr lang="en-US" smtClean="0"/>
-              <a:t>11/21/2013</a:t>
+              <a:t>12/5/2013</a:t>
             </a:fld>
             <a:endParaRPr lang="en-US"/>
           </a:p>
@@ -2507,7 +2507,7 @@
           <a:p>
             <a:fld id="{BFEB8134-79A7-470D-984F-A9AEAC224976}" type="datetimeFigureOut">
               <a:rPr lang="en-US" smtClean="0"/>
-              <a:t>11/21/2013</a:t>
+              <a:t>12/5/2013</a:t>
             </a:fld>
             <a:endParaRPr lang="en-US"/>
           </a:p>
@@ -2720,7 +2720,7 @@
           <a:p>
             <a:fld id="{BFEB8134-79A7-470D-984F-A9AEAC224976}" type="datetimeFigureOut">
               <a:rPr lang="en-US" smtClean="0"/>
-              <a:t>11/21/2013</a:t>
+              <a:t>12/5/2013</a:t>
             </a:fld>
             <a:endParaRPr lang="en-US"/>
           </a:p>
@@ -5796,50 +5796,6 @@
           </a:fontRef>
         </p:style>
       </p:cxnSp>
-      <p:sp>
-        <p:nvSpPr>
-          <p:cNvPr id="69" name="Oval 68"/>
-          <p:cNvSpPr/>
-          <p:nvPr/>
-        </p:nvSpPr>
-        <p:spPr>
-          <a:xfrm>
-            <a:off x="8357977" y="3011143"/>
-            <a:ext cx="381000" cy="381000"/>
-          </a:xfrm>
-          <a:prstGeom prst="ellipse">
-            <a:avLst/>
-          </a:prstGeom>
-        </p:spPr>
-        <p:style>
-          <a:lnRef idx="2">
-            <a:schemeClr val="accent1">
-              <a:shade val="50000"/>
-            </a:schemeClr>
-          </a:lnRef>
-          <a:fillRef idx="1">
-            <a:schemeClr val="accent1"/>
-          </a:fillRef>
-          <a:effectRef idx="0">
-            <a:schemeClr val="accent1"/>
-          </a:effectRef>
-          <a:fontRef idx="minor">
-            <a:schemeClr val="lt1"/>
-          </a:fontRef>
-        </p:style>
-        <p:txBody>
-          <a:bodyPr rtlCol="0" anchor="ctr"/>
-          <a:lstStyle/>
-          <a:p>
-            <a:pPr algn="ctr"/>
-            <a:r>
-              <a:rPr lang="en-US" dirty="0" smtClean="0"/>
-              <a:t>W</a:t>
-            </a:r>
-            <a:endParaRPr lang="en-US" dirty="0"/>
-          </a:p>
-        </p:txBody>
-      </p:sp>
       <p:sp>
         <p:nvSpPr>
           <p:cNvPr id="74" name="Oval 73"/>

</xml_diff>